<commit_message>
compile HTML & PDF
</commit_message>
<xml_diff>
--- a/images/history/discoveries.pptx
+++ b/images/history/discoveries.pptx
@@ -3450,6 +3450,111 @@
           </a:prstGeom>
         </p:spPr>
       </p:pic>
+      <p:sp>
+        <p:nvSpPr>
+          <p:cNvPr id="11" name="TextBox 10">
+            <a:extLst>
+              <a:ext uri="{FF2B5EF4-FFF2-40B4-BE49-F238E27FC236}">
+                <a16:creationId xmlns:a16="http://schemas.microsoft.com/office/drawing/2014/main" id="{A05BA880-2140-2F6B-9DEE-24191C941836}"/>
+              </a:ext>
+            </a:extLst>
+          </p:cNvPr>
+          <p:cNvSpPr txBox="1"/>
+          <p:nvPr/>
+        </p:nvSpPr>
+        <p:spPr>
+          <a:xfrm>
+            <a:off x="629377" y="1219200"/>
+            <a:ext cx="4104548" cy="338554"/>
+          </a:xfrm>
+          <a:prstGeom prst="rect">
+            <a:avLst/>
+          </a:prstGeom>
+          <a:noFill/>
+        </p:spPr>
+        <p:txBody>
+          <a:bodyPr wrap="square" rtlCol="0">
+            <a:spAutoFit/>
+          </a:bodyPr>
+          <a:lstStyle/>
+          <a:p>
+            <a:r>
+              <a:rPr lang="en-CA" sz="1600" dirty="0"/>
+              <a:t>Maunder, butterfly diagram</a:t>
+            </a:r>
+          </a:p>
+        </p:txBody>
+      </p:sp>
+      <p:sp>
+        <p:nvSpPr>
+          <p:cNvPr id="12" name="TextBox 11">
+            <a:extLst>
+              <a:ext uri="{FF2B5EF4-FFF2-40B4-BE49-F238E27FC236}">
+                <a16:creationId xmlns:a16="http://schemas.microsoft.com/office/drawing/2014/main" id="{F96F0977-C074-97E0-640F-E21105819721}"/>
+              </a:ext>
+            </a:extLst>
+          </p:cNvPr>
+          <p:cNvSpPr txBox="1"/>
+          <p:nvPr/>
+        </p:nvSpPr>
+        <p:spPr>
+          <a:xfrm>
+            <a:off x="5304707" y="1219200"/>
+            <a:ext cx="2153370" cy="338554"/>
+          </a:xfrm>
+          <a:prstGeom prst="rect">
+            <a:avLst/>
+          </a:prstGeom>
+          <a:noFill/>
+        </p:spPr>
+        <p:txBody>
+          <a:bodyPr wrap="square" rtlCol="0">
+            <a:spAutoFit/>
+          </a:bodyPr>
+          <a:lstStyle/>
+          <a:p>
+            <a:r>
+              <a:rPr lang="en-CA" sz="1600" dirty="0"/>
+              <a:t>Hertzsprung-Russell</a:t>
+            </a:r>
+          </a:p>
+        </p:txBody>
+      </p:sp>
+      <p:sp>
+        <p:nvSpPr>
+          <p:cNvPr id="13" name="TextBox 12">
+            <a:extLst>
+              <a:ext uri="{FF2B5EF4-FFF2-40B4-BE49-F238E27FC236}">
+                <a16:creationId xmlns:a16="http://schemas.microsoft.com/office/drawing/2014/main" id="{4A2E23E0-B162-A2E9-B875-6142E3FCEFA0}"/>
+              </a:ext>
+            </a:extLst>
+          </p:cNvPr>
+          <p:cNvSpPr txBox="1"/>
+          <p:nvPr/>
+        </p:nvSpPr>
+        <p:spPr>
+          <a:xfrm>
+            <a:off x="7861937" y="1219200"/>
+            <a:ext cx="2329813" cy="338554"/>
+          </a:xfrm>
+          <a:prstGeom prst="rect">
+            <a:avLst/>
+          </a:prstGeom>
+          <a:noFill/>
+        </p:spPr>
+        <p:txBody>
+          <a:bodyPr wrap="square" rtlCol="0">
+            <a:spAutoFit/>
+          </a:bodyPr>
+          <a:lstStyle/>
+          <a:p>
+            <a:r>
+              <a:rPr lang="en-CA" sz="1600" dirty="0"/>
+              <a:t>Moseley, atomic weight</a:t>
+            </a:r>
+          </a:p>
+        </p:txBody>
+      </p:sp>
     </p:spTree>
     <p:extLst>
       <p:ext uri="{BB962C8B-B14F-4D97-AF65-F5344CB8AC3E}">

</xml_diff>